<commit_message>
add phi.pptx Zmodn.pptx, delete euler.pptx, edit ps5
</commit_message>
<xml_diff>
--- a/spring12/slidesS12/congruence.pptx
+++ b/spring12/slidesS12/congruence.pptx
@@ -3760,11 +3760,7 @@
             </a:r>
             <a:r>
               <a:rPr lang="en-US" dirty="0" smtClean="0"/>
-              <a:t> </a:t>
-            </a:r>
-            <a:r>
-              <a:rPr lang="en-US" dirty="0" smtClean="0"/>
-              <a:t>5W.</a:t>
+              <a:t> 5W.</a:t>
             </a:r>
             <a:fld id="{5653AFC6-B420-2E4E-AAAC-D734658728B4}" type="slidenum">
               <a:rPr lang="en-US" smtClean="0"/>
@@ -3868,11 +3864,7 @@
             </a:r>
             <a:r>
               <a:rPr lang="en-US" dirty="0" smtClean="0"/>
-              <a:t> </a:t>
-            </a:r>
-            <a:r>
-              <a:rPr lang="en-US" dirty="0" smtClean="0"/>
-              <a:t>5W.</a:t>
+              <a:t> 5W.</a:t>
             </a:r>
             <a:fld id="{5653AFC6-B420-2E4E-AAAC-D734658728B4}" type="slidenum">
               <a:rPr lang="en-US" smtClean="0"/>
@@ -3945,11 +3937,7 @@
             </a:r>
             <a:r>
               <a:rPr lang="en-US" dirty="0" smtClean="0"/>
-              <a:t> </a:t>
-            </a:r>
-            <a:r>
-              <a:rPr lang="en-US" dirty="0" smtClean="0"/>
-              <a:t>5W.</a:t>
+              <a:t> 5W.</a:t>
             </a:r>
             <a:fld id="{5653AFC6-B420-2E4E-AAAC-D734658728B4}" type="slidenum">
               <a:rPr lang="en-US" smtClean="0"/>
@@ -4182,52 +4170,7 @@
                 <a:uFillTx/>
                 <a:latin typeface="Comic Sans MS" pitchFamily="66" charset="0"/>
               </a:rPr>
-              <a:t>Albert R Meyer,        </a:t>
-            </a:r>
-            <a:r>
-              <a:rPr kumimoji="0" lang="en-US" sz="1200" b="0" i="0" u="none" strike="noStrike" kern="1200" cap="none" spc="0" normalizeH="0" baseline="0" noProof="0" dirty="0" smtClean="0">
-                <a:ln>
-                  <a:noFill/>
-                </a:ln>
-                <a:solidFill>
-                  <a:schemeClr val="tx1"/>
-                </a:solidFill>
-                <a:effectLst/>
-                <a:uLnTx/>
-                <a:uFillTx/>
-                <a:latin typeface="Comic Sans MS" pitchFamily="66" charset="0"/>
-              </a:rPr>
-              <a:t>March </a:t>
-            </a:r>
-            <a:r>
-              <a:rPr kumimoji="0" lang="en-US" sz="1200" b="0" i="0" u="none" strike="noStrike" kern="1200" cap="none" spc="0" normalizeH="0" baseline="0" noProof="0" dirty="0" smtClean="0">
-                <a:ln>
-                  <a:noFill/>
-                </a:ln>
-                <a:solidFill>
-                  <a:schemeClr val="tx1"/>
-                </a:solidFill>
-                <a:effectLst/>
-                <a:uLnTx/>
-                <a:uFillTx/>
-                <a:latin typeface="Comic Sans MS" pitchFamily="66" charset="0"/>
-              </a:rPr>
-              <a:t>7, </a:t>
-            </a:r>
-            <a:r>
-              <a:rPr kumimoji="0" lang="en-US" sz="1200" b="0" i="0" u="none" strike="noStrike" kern="1200" cap="none" spc="0" normalizeH="0" baseline="0" noProof="0" dirty="0" smtClean="0">
-                <a:ln>
-                  <a:noFill/>
-                </a:ln>
-                <a:solidFill>
-                  <a:schemeClr val="tx1"/>
-                </a:solidFill>
-                <a:effectLst/>
-                <a:uLnTx/>
-                <a:uFillTx/>
-                <a:latin typeface="Comic Sans MS" pitchFamily="66" charset="0"/>
-              </a:rPr>
-              <a:t>2012</a:t>
+              <a:t>Albert R Meyer,        March 7, 2012</a:t>
             </a:r>
             <a:endParaRPr kumimoji="0" lang="en-US" sz="1200" b="0" i="0" u="none" strike="noStrike" kern="1200" cap="none" spc="0" normalizeH="0" baseline="0" noProof="0" dirty="0">
               <a:ln>
@@ -4305,11 +4248,7 @@
             </a:r>
             <a:r>
               <a:rPr lang="en-US" dirty="0" smtClean="0"/>
-              <a:t> </a:t>
-            </a:r>
-            <a:r>
-              <a:rPr lang="en-US" dirty="0" smtClean="0"/>
-              <a:t>5W.</a:t>
+              <a:t> 5W.</a:t>
             </a:r>
             <a:fld id="{5653AFC6-B420-2E4E-AAAC-D734658728B4}" type="slidenum">
               <a:rPr lang="en-US" smtClean="0"/>
@@ -4892,11 +4831,7 @@
             </a:r>
             <a:r>
               <a:rPr lang="en-US" dirty="0" smtClean="0"/>
-              <a:t> </a:t>
-            </a:r>
-            <a:r>
-              <a:rPr lang="en-US" dirty="0" smtClean="0"/>
-              <a:t>5W.</a:t>
+              <a:t> 5W.</a:t>
             </a:r>
             <a:fld id="{5653AFC6-B420-2E4E-AAAC-D734658728B4}" type="slidenum">
               <a:rPr lang="en-US" smtClean="0"/>
@@ -5690,11 +5625,7 @@
             </a:r>
             <a:r>
               <a:rPr lang="en-US" dirty="0" smtClean="0"/>
-              <a:t> </a:t>
-            </a:r>
-            <a:r>
-              <a:rPr lang="en-US" dirty="0" smtClean="0"/>
-              <a:t>5W.</a:t>
+              <a:t> 5W.</a:t>
             </a:r>
             <a:fld id="{5653AFC6-B420-2E4E-AAAC-D734658728B4}" type="slidenum">
               <a:rPr lang="en-US" smtClean="0"/>
@@ -6466,11 +6397,7 @@
             </a:r>
             <a:r>
               <a:rPr lang="en-US" dirty="0" smtClean="0"/>
-              <a:t> </a:t>
-            </a:r>
-            <a:r>
-              <a:rPr lang="en-US" dirty="0" smtClean="0"/>
-              <a:t>5W.</a:t>
+              <a:t> 5W.</a:t>
             </a:r>
             <a:fld id="{5653AFC6-B420-2E4E-AAAC-D734658728B4}" type="slidenum">
               <a:rPr lang="en-US" smtClean="0"/>
@@ -7156,11 +7083,7 @@
             </a:r>
             <a:r>
               <a:rPr lang="en-US" dirty="0" smtClean="0"/>
-              <a:t> </a:t>
-            </a:r>
-            <a:r>
-              <a:rPr lang="en-US" dirty="0" smtClean="0"/>
-              <a:t>5W.</a:t>
+              <a:t> 5W.</a:t>
             </a:r>
             <a:fld id="{5653AFC6-B420-2E4E-AAAC-D734658728B4}" type="slidenum">
               <a:rPr lang="en-US" smtClean="0"/>
@@ -7176,13 +7099,13 @@
   <p:clrMapOvr>
     <a:masterClrMapping/>
   </p:clrMapOvr>
-  <mc:AlternateContent xmlns:mc="http://schemas.openxmlformats.org/markup-compatibility/2006">
-    <mc:Choice xmlns:p14="http://schemas.microsoft.com/office/powerpoint/2010/main" Requires="p14">
+  <mc:AlternateContent xmlns:mc="http://schemas.openxmlformats.org/markup-compatibility/2006" xmlns:p14="http://schemas.microsoft.com/office/powerpoint/2010/main">
+    <mc:Choice Requires="p14">
       <p:transition spd="med" p14:dur="700">
         <p:fade thruBlk="1"/>
       </p:transition>
     </mc:Choice>
-    <mc:Fallback>
+    <mc:Fallback xmlns="">
       <p:transition xmlns:p14="http://schemas.microsoft.com/office/powerpoint/2010/main" spd="med">
         <p:fade thruBlk="1"/>
       </p:transition>
@@ -7752,15 +7675,7 @@
                   <a:srgbClr val="0000E5"/>
                 </a:solidFill>
               </a:rPr>
-              <a:t>rem</a:t>
-            </a:r>
-            <a:r>
-              <a:rPr lang="en-US" sz="6000" dirty="0">
-                <a:solidFill>
-                  <a:srgbClr val="0000E5"/>
-                </a:solidFill>
-              </a:rPr>
-              <a:t>(</a:t>
+              <a:t>rem(</a:t>
             </a:r>
             <a:r>
               <a:rPr lang="en-US" sz="6000" dirty="0" err="1">
@@ -7856,11 +7771,7 @@
             </a:r>
             <a:r>
               <a:rPr lang="en-US" dirty="0" smtClean="0"/>
-              <a:t> </a:t>
-            </a:r>
-            <a:r>
-              <a:rPr lang="en-US" dirty="0" smtClean="0"/>
-              <a:t>5W.</a:t>
+              <a:t> 5W.</a:t>
             </a:r>
             <a:fld id="{5653AFC6-B420-2E4E-AAAC-D734658728B4}" type="slidenum">
               <a:rPr lang="en-US" smtClean="0"/>
@@ -8497,11 +8408,7 @@
             </a:r>
             <a:r>
               <a:rPr lang="en-US" dirty="0" smtClean="0"/>
-              <a:t> </a:t>
-            </a:r>
-            <a:r>
-              <a:rPr lang="en-US" dirty="0" smtClean="0"/>
-              <a:t>5W.</a:t>
+              <a:t> 5W.</a:t>
             </a:r>
             <a:fld id="{5653AFC6-B420-2E4E-AAAC-D734658728B4}" type="slidenum">
               <a:rPr lang="en-US" smtClean="0"/>
@@ -9414,11 +9321,7 @@
             </a:r>
             <a:r>
               <a:rPr lang="en-US" dirty="0" smtClean="0"/>
-              <a:t> </a:t>
-            </a:r>
-            <a:r>
-              <a:rPr lang="en-US" dirty="0" smtClean="0"/>
-              <a:t>5W.</a:t>
+              <a:t> 5W.</a:t>
             </a:r>
             <a:fld id="{5653AFC6-B420-2E4E-AAAC-D734658728B4}" type="slidenum">
               <a:rPr lang="en-US" smtClean="0"/>
@@ -10325,11 +10228,7 @@
             </a:r>
             <a:r>
               <a:rPr lang="en-US" dirty="0" smtClean="0"/>
-              <a:t> </a:t>
-            </a:r>
-            <a:r>
-              <a:rPr lang="en-US" dirty="0" smtClean="0"/>
-              <a:t>5W.</a:t>
+              <a:t> 5W.</a:t>
             </a:r>
             <a:fld id="{5653AFC6-B420-2E4E-AAAC-D734658728B4}" type="slidenum">
               <a:rPr lang="en-US" smtClean="0"/>
@@ -11089,11 +10988,7 @@
             </a:r>
             <a:r>
               <a:rPr lang="en-US" dirty="0" smtClean="0"/>
-              <a:t> </a:t>
-            </a:r>
-            <a:r>
-              <a:rPr lang="en-US" dirty="0" smtClean="0"/>
-              <a:t>5W.</a:t>
+              <a:t> 5W.</a:t>
             </a:r>
             <a:fld id="{5653AFC6-B420-2E4E-AAAC-D734658728B4}" type="slidenum">
               <a:rPr lang="en-US" smtClean="0"/>
@@ -11862,11 +11757,7 @@
             </a:r>
             <a:r>
               <a:rPr lang="en-US" dirty="0" smtClean="0"/>
-              <a:t> </a:t>
-            </a:r>
-            <a:r>
-              <a:rPr lang="en-US" dirty="0" smtClean="0"/>
-              <a:t>5W.</a:t>
+              <a:t> 5W.</a:t>
             </a:r>
             <a:fld id="{5653AFC6-B420-2E4E-AAAC-D734658728B4}" type="slidenum">
               <a:rPr lang="en-US" smtClean="0"/>
@@ -12560,13 +12451,13 @@
   <p:clrMapOvr>
     <a:masterClrMapping/>
   </p:clrMapOvr>
-  <mc:AlternateContent xmlns:mc="http://schemas.openxmlformats.org/markup-compatibility/2006">
-    <mc:Choice xmlns:p14="http://schemas.microsoft.com/office/powerpoint/2010/main" Requires="p14">
+  <mc:AlternateContent xmlns:mc="http://schemas.openxmlformats.org/markup-compatibility/2006" xmlns:p14="http://schemas.microsoft.com/office/powerpoint/2010/main">
+    <mc:Choice Requires="p14">
       <p:transition spd="med" p14:dur="700">
         <p:fade/>
       </p:transition>
     </mc:Choice>
-    <mc:Fallback>
+    <mc:Fallback xmlns="">
       <p:transition xmlns:p14="http://schemas.microsoft.com/office/powerpoint/2010/main" spd="med">
         <p:fade/>
       </p:transition>
@@ -12855,11 +12746,7 @@
             </a:r>
             <a:r>
               <a:rPr lang="en-US" sz="5400" dirty="0" smtClean="0"/>
-              <a:t>divides </a:t>
-            </a:r>
-            <a:r>
-              <a:rPr lang="en-US" sz="5400" dirty="0" smtClean="0"/>
-              <a:t>(</a:t>
+              <a:t>divides (</a:t>
             </a:r>
             <a:r>
               <a:rPr lang="en-US" sz="5400" dirty="0" smtClean="0">
@@ -12970,11 +12857,7 @@
             </a:r>
             <a:r>
               <a:rPr lang="en-US" dirty="0" smtClean="0"/>
-              <a:t> </a:t>
-            </a:r>
-            <a:r>
-              <a:rPr lang="en-US" dirty="0" smtClean="0"/>
-              <a:t>5W.</a:t>
+              <a:t> 5W.</a:t>
             </a:r>
             <a:fld id="{5653AFC6-B420-2E4E-AAAC-D734658728B4}" type="slidenum">
               <a:rPr lang="en-US" smtClean="0"/>
@@ -13463,11 +13346,7 @@
             </a:r>
             <a:r>
               <a:rPr lang="en-US" dirty="0" smtClean="0"/>
-              <a:t> </a:t>
-            </a:r>
-            <a:r>
-              <a:rPr lang="en-US" dirty="0" smtClean="0"/>
-              <a:t>5W.</a:t>
+              <a:t> 5W.</a:t>
             </a:r>
             <a:fld id="{5653AFC6-B420-2E4E-AAAC-D734658728B4}" type="slidenum">
               <a:rPr lang="en-US" smtClean="0"/>
@@ -14297,11 +14176,7 @@
             </a:r>
             <a:r>
               <a:rPr lang="en-US" dirty="0" smtClean="0"/>
-              <a:t> </a:t>
-            </a:r>
-            <a:r>
-              <a:rPr lang="en-US" dirty="0" smtClean="0"/>
-              <a:t>5W.</a:t>
+              <a:t> 5W.</a:t>
             </a:r>
             <a:fld id="{5653AFC6-B420-2E4E-AAAC-D734658728B4}" type="slidenum">
               <a:rPr lang="en-US" smtClean="0"/>
@@ -15100,11 +14975,7 @@
             </a:r>
             <a:r>
               <a:rPr lang="en-US" dirty="0" smtClean="0"/>
-              <a:t> </a:t>
-            </a:r>
-            <a:r>
-              <a:rPr lang="en-US" dirty="0" smtClean="0"/>
-              <a:t>5W.</a:t>
+              <a:t> 5W.</a:t>
             </a:r>
             <a:fld id="{5653AFC6-B420-2E4E-AAAC-D734658728B4}" type="slidenum">
               <a:rPr lang="en-US" smtClean="0"/>
@@ -15891,11 +15762,7 @@
             </a:r>
             <a:r>
               <a:rPr lang="en-US" dirty="0" smtClean="0"/>
-              <a:t> </a:t>
-            </a:r>
-            <a:r>
-              <a:rPr lang="en-US" dirty="0" smtClean="0"/>
-              <a:t>5W.</a:t>
+              <a:t> 5W.</a:t>
             </a:r>
             <a:fld id="{5653AFC6-B420-2E4E-AAAC-D734658728B4}" type="slidenum">
               <a:rPr lang="en-US" smtClean="0"/>
@@ -16662,11 +16529,7 @@
             </a:r>
             <a:r>
               <a:rPr lang="en-US" dirty="0" smtClean="0"/>
-              <a:t> </a:t>
-            </a:r>
-            <a:r>
-              <a:rPr lang="en-US" dirty="0" smtClean="0"/>
-              <a:t>5W.</a:t>
+              <a:t> 5W.</a:t>
             </a:r>
             <a:fld id="{5653AFC6-B420-2E4E-AAAC-D734658728B4}" type="slidenum">
               <a:rPr lang="en-US" smtClean="0"/>
@@ -17364,11 +17227,7 @@
             </a:r>
             <a:r>
               <a:rPr lang="en-US" dirty="0" smtClean="0"/>
-              <a:t> </a:t>
-            </a:r>
-            <a:r>
-              <a:rPr lang="en-US" dirty="0" smtClean="0"/>
-              <a:t>5W.</a:t>
+              <a:t> 5W.</a:t>
             </a:r>
             <a:fld id="{5653AFC6-B420-2E4E-AAAC-D734658728B4}" type="slidenum">
               <a:rPr lang="en-US" smtClean="0"/>
@@ -18278,11 +18137,7 @@
             </a:r>
             <a:r>
               <a:rPr lang="en-US" dirty="0" smtClean="0"/>
-              <a:t> </a:t>
-            </a:r>
-            <a:r>
-              <a:rPr lang="en-US" dirty="0" smtClean="0"/>
-              <a:t>5W.</a:t>
+              <a:t> 5W.</a:t>
             </a:r>
             <a:fld id="{5653AFC6-B420-2E4E-AAAC-D734658728B4}" type="slidenum">
               <a:rPr lang="en-US" smtClean="0"/>
@@ -19324,11 +19179,7 @@
             </a:r>
             <a:r>
               <a:rPr lang="en-US" dirty="0" smtClean="0"/>
-              <a:t> </a:t>
-            </a:r>
-            <a:r>
-              <a:rPr lang="en-US" dirty="0" smtClean="0"/>
-              <a:t>5W.</a:t>
+              <a:t> 5W.</a:t>
             </a:r>
             <a:fld id="{5653AFC6-B420-2E4E-AAAC-D734658728B4}" type="slidenum">
               <a:rPr lang="en-US" smtClean="0"/>
@@ -19344,13 +19195,13 @@
   <p:clrMapOvr>
     <a:masterClrMapping/>
   </p:clrMapOvr>
-  <mc:AlternateContent xmlns:mc="http://schemas.openxmlformats.org/markup-compatibility/2006">
-    <mc:Choice xmlns:p14="http://schemas.microsoft.com/office/powerpoint/2010/main" Requires="p14">
+  <mc:AlternateContent xmlns:mc="http://schemas.openxmlformats.org/markup-compatibility/2006" xmlns:p14="http://schemas.microsoft.com/office/powerpoint/2010/main">
+    <mc:Choice Requires="p14">
       <p:transition spd="med" p14:dur="700">
         <p:fade/>
       </p:transition>
     </mc:Choice>
-    <mc:Fallback>
+    <mc:Fallback xmlns="">
       <p:transition xmlns:p14="http://schemas.microsoft.com/office/powerpoint/2010/main" spd="med">
         <p:fade/>
       </p:transition>
@@ -20130,11 +19981,7 @@
             </a:r>
             <a:r>
               <a:rPr lang="en-US" dirty="0" smtClean="0"/>
-              <a:t> </a:t>
-            </a:r>
-            <a:r>
-              <a:rPr lang="en-US" dirty="0" smtClean="0"/>
-              <a:t>5W.</a:t>
+              <a:t> 5W.</a:t>
             </a:r>
             <a:fld id="{5653AFC6-B420-2E4E-AAAC-D734658728B4}" type="slidenum">
               <a:rPr lang="en-US" smtClean="0"/>

</xml_diff>